<commit_message>
still updating help files
</commit_message>
<xml_diff>
--- a/data-raw/VCF-to-spectra.guide-images.pptx
+++ b/data-raw/VCF-to-spectra.guide-images.pptx
@@ -110,6 +110,11 @@
       </a:defRPr>
     </a:lvl9pPr>
   </p:defaultTextStyle>
+  <p:extLst>
+    <p:ext uri="{EFAFB233-063F-42B5-8137-9DF3F51BA10A}">
+      <p15:sldGuideLst xmlns:p15="http://schemas.microsoft.com/office/powerpoint/2012/main"/>
+    </p:ext>
+  </p:extLst>
 </p:presentation>
 </file>
 
@@ -4173,7 +4178,7 @@
           <a:p>
             <a:r>
               <a:rPr lang="en-SG" dirty="0"/>
-              <a:t>What kind of variant caller generated the data? Different variant callers have slightly different formats and information.  For instance, Mutect puts single base substation mutations and indels in the same VCF, while Strelka puts them in separate VCFs.  Mutect keeps track of DBS (doublet base substitutions) that are on the same reads; Strelka does not.  </a:t>
+              <a:t>What kind of variant caller generated the VCFs? Different variant callers have slightly different formats and information.  For instance, Mutect puts single base substation mutations and indels in the same VCF, while Strelka puts them in separate VCFs.  Mutect keeps track of DBS (doublet base substitutions) that are on the same reads; Strelka does not.  </a:t>
             </a:r>
           </a:p>
         </p:txBody>

</xml_diff>

<commit_message>
more work on documentation
</commit_message>
<xml_diff>
--- a/data-raw/VCF-to-spectra.guide-images.pptx
+++ b/data-raw/VCF-to-spectra.guide-images.pptx
@@ -12,6 +12,14 @@
     <p:sldId id="260" r:id="rId6"/>
     <p:sldId id="261" r:id="rId7"/>
     <p:sldId id="262" r:id="rId8"/>
+    <p:sldId id="263" r:id="rId9"/>
+    <p:sldId id="264" r:id="rId10"/>
+    <p:sldId id="266" r:id="rId11"/>
+    <p:sldId id="267" r:id="rId12"/>
+    <p:sldId id="268" r:id="rId13"/>
+    <p:sldId id="269" r:id="rId14"/>
+    <p:sldId id="270" r:id="rId15"/>
+    <p:sldId id="265" r:id="rId16"/>
   </p:sldIdLst>
   <p:sldSz cx="9144000" cy="6858000" type="letter"/>
   <p:notesSz cx="6858000" cy="9144000"/>
@@ -3019,6 +3027,574 @@
 </p:sld>
 </file>
 
+<file path=ppt/slides/slide10.xml><?xml version="1.0" encoding="utf-8"?>
+<p:sld xmlns:a="http://schemas.openxmlformats.org/drawingml/2006/main" xmlns:r="http://schemas.openxmlformats.org/officeDocument/2006/relationships" xmlns:p="http://schemas.openxmlformats.org/presentationml/2006/main">
+  <p:cSld>
+    <p:spTree>
+      <p:nvGrpSpPr>
+        <p:cNvPr id="1" name=""/>
+        <p:cNvGrpSpPr/>
+        <p:nvPr/>
+      </p:nvGrpSpPr>
+      <p:grpSpPr>
+        <a:xfrm>
+          <a:off x="0" y="0"/>
+          <a:ext cx="0" cy="0"/>
+          <a:chOff x="0" y="0"/>
+          <a:chExt cx="0" cy="0"/>
+        </a:xfrm>
+      </p:grpSpPr>
+      <p:pic>
+        <p:nvPicPr>
+          <p:cNvPr id="3" name="Picture 2">
+            <a:extLst>
+              <a:ext uri="{FF2B5EF4-FFF2-40B4-BE49-F238E27FC236}">
+                <a16:creationId xmlns:a16="http://schemas.microsoft.com/office/drawing/2014/main" id="{0E76048E-3838-486F-A7C5-753B5ECBD433}"/>
+              </a:ext>
+            </a:extLst>
+          </p:cNvPr>
+          <p:cNvPicPr>
+            <a:picLocks noChangeAspect="1"/>
+          </p:cNvPicPr>
+          <p:nvPr/>
+        </p:nvPicPr>
+        <p:blipFill>
+          <a:blip r:embed="rId2"/>
+          <a:stretch>
+            <a:fillRect/>
+          </a:stretch>
+        </p:blipFill>
+        <p:spPr>
+          <a:xfrm>
+            <a:off x="0" y="716507"/>
+            <a:ext cx="9144000" cy="5424985"/>
+          </a:xfrm>
+          <a:prstGeom prst="rect">
+            <a:avLst/>
+          </a:prstGeom>
+        </p:spPr>
+      </p:pic>
+    </p:spTree>
+    <p:extLst>
+      <p:ext uri="{BB962C8B-B14F-4D97-AF65-F5344CB8AC3E}">
+        <p14:creationId xmlns:p14="http://schemas.microsoft.com/office/powerpoint/2010/main" val="3072511757"/>
+      </p:ext>
+    </p:extLst>
+  </p:cSld>
+  <p:clrMapOvr>
+    <a:masterClrMapping/>
+  </p:clrMapOvr>
+</p:sld>
+</file>
+
+<file path=ppt/slides/slide11.xml><?xml version="1.0" encoding="utf-8"?>
+<p:sld xmlns:a="http://schemas.openxmlformats.org/drawingml/2006/main" xmlns:r="http://schemas.openxmlformats.org/officeDocument/2006/relationships" xmlns:p="http://schemas.openxmlformats.org/presentationml/2006/main">
+  <p:cSld>
+    <p:spTree>
+      <p:nvGrpSpPr>
+        <p:cNvPr id="1" name=""/>
+        <p:cNvGrpSpPr/>
+        <p:nvPr/>
+      </p:nvGrpSpPr>
+      <p:grpSpPr>
+        <a:xfrm>
+          <a:off x="0" y="0"/>
+          <a:ext cx="0" cy="0"/>
+          <a:chOff x="0" y="0"/>
+          <a:chExt cx="0" cy="0"/>
+        </a:xfrm>
+      </p:grpSpPr>
+      <p:pic>
+        <p:nvPicPr>
+          <p:cNvPr id="3" name="Picture 2">
+            <a:extLst>
+              <a:ext uri="{FF2B5EF4-FFF2-40B4-BE49-F238E27FC236}">
+                <a16:creationId xmlns:a16="http://schemas.microsoft.com/office/drawing/2014/main" id="{092E7AB5-7091-4A37-834C-AAE6D2566114}"/>
+              </a:ext>
+            </a:extLst>
+          </p:cNvPr>
+          <p:cNvPicPr>
+            <a:picLocks noChangeAspect="1"/>
+          </p:cNvPicPr>
+          <p:nvPr/>
+        </p:nvPicPr>
+        <p:blipFill>
+          <a:blip r:embed="rId2"/>
+          <a:stretch>
+            <a:fillRect/>
+          </a:stretch>
+        </p:blipFill>
+        <p:spPr>
+          <a:xfrm>
+            <a:off x="0" y="716507"/>
+            <a:ext cx="9144000" cy="5424985"/>
+          </a:xfrm>
+          <a:prstGeom prst="rect">
+            <a:avLst/>
+          </a:prstGeom>
+        </p:spPr>
+      </p:pic>
+    </p:spTree>
+    <p:extLst>
+      <p:ext uri="{BB962C8B-B14F-4D97-AF65-F5344CB8AC3E}">
+        <p14:creationId xmlns:p14="http://schemas.microsoft.com/office/powerpoint/2010/main" val="1211825085"/>
+      </p:ext>
+    </p:extLst>
+  </p:cSld>
+  <p:clrMapOvr>
+    <a:masterClrMapping/>
+  </p:clrMapOvr>
+</p:sld>
+</file>
+
+<file path=ppt/slides/slide12.xml><?xml version="1.0" encoding="utf-8"?>
+<p:sld xmlns:a="http://schemas.openxmlformats.org/drawingml/2006/main" xmlns:r="http://schemas.openxmlformats.org/officeDocument/2006/relationships" xmlns:p="http://schemas.openxmlformats.org/presentationml/2006/main">
+  <p:cSld>
+    <p:spTree>
+      <p:nvGrpSpPr>
+        <p:cNvPr id="1" name=""/>
+        <p:cNvGrpSpPr/>
+        <p:nvPr/>
+      </p:nvGrpSpPr>
+      <p:grpSpPr>
+        <a:xfrm>
+          <a:off x="0" y="0"/>
+          <a:ext cx="0" cy="0"/>
+          <a:chOff x="0" y="0"/>
+          <a:chExt cx="0" cy="0"/>
+        </a:xfrm>
+      </p:grpSpPr>
+      <p:pic>
+        <p:nvPicPr>
+          <p:cNvPr id="3" name="Picture 2">
+            <a:extLst>
+              <a:ext uri="{FF2B5EF4-FFF2-40B4-BE49-F238E27FC236}">
+                <a16:creationId xmlns:a16="http://schemas.microsoft.com/office/drawing/2014/main" id="{5FBA5966-532C-47E6-9EA6-0EF11D432E20}"/>
+              </a:ext>
+            </a:extLst>
+          </p:cNvPr>
+          <p:cNvPicPr>
+            <a:picLocks noChangeAspect="1"/>
+          </p:cNvPicPr>
+          <p:nvPr/>
+        </p:nvPicPr>
+        <p:blipFill>
+          <a:blip r:embed="rId2"/>
+          <a:stretch>
+            <a:fillRect/>
+          </a:stretch>
+        </p:blipFill>
+        <p:spPr>
+          <a:xfrm>
+            <a:off x="0" y="716507"/>
+            <a:ext cx="9144000" cy="5424985"/>
+          </a:xfrm>
+          <a:prstGeom prst="rect">
+            <a:avLst/>
+          </a:prstGeom>
+        </p:spPr>
+      </p:pic>
+    </p:spTree>
+    <p:extLst>
+      <p:ext uri="{BB962C8B-B14F-4D97-AF65-F5344CB8AC3E}">
+        <p14:creationId xmlns:p14="http://schemas.microsoft.com/office/powerpoint/2010/main" val="4221034325"/>
+      </p:ext>
+    </p:extLst>
+  </p:cSld>
+  <p:clrMapOvr>
+    <a:masterClrMapping/>
+  </p:clrMapOvr>
+</p:sld>
+</file>
+
+<file path=ppt/slides/slide13.xml><?xml version="1.0" encoding="utf-8"?>
+<p:sld xmlns:a="http://schemas.openxmlformats.org/drawingml/2006/main" xmlns:r="http://schemas.openxmlformats.org/officeDocument/2006/relationships" xmlns:p="http://schemas.openxmlformats.org/presentationml/2006/main">
+  <p:cSld>
+    <p:spTree>
+      <p:nvGrpSpPr>
+        <p:cNvPr id="1" name=""/>
+        <p:cNvGrpSpPr/>
+        <p:nvPr/>
+      </p:nvGrpSpPr>
+      <p:grpSpPr>
+        <a:xfrm>
+          <a:off x="0" y="0"/>
+          <a:ext cx="0" cy="0"/>
+          <a:chOff x="0" y="0"/>
+          <a:chExt cx="0" cy="0"/>
+        </a:xfrm>
+      </p:grpSpPr>
+      <p:pic>
+        <p:nvPicPr>
+          <p:cNvPr id="3" name="Picture 2">
+            <a:extLst>
+              <a:ext uri="{FF2B5EF4-FFF2-40B4-BE49-F238E27FC236}">
+                <a16:creationId xmlns:a16="http://schemas.microsoft.com/office/drawing/2014/main" id="{EE43AEDC-AC52-4B2B-9D37-B44973C9BAC9}"/>
+              </a:ext>
+            </a:extLst>
+          </p:cNvPr>
+          <p:cNvPicPr>
+            <a:picLocks noChangeAspect="1"/>
+          </p:cNvPicPr>
+          <p:nvPr/>
+        </p:nvPicPr>
+        <p:blipFill>
+          <a:blip r:embed="rId2"/>
+          <a:stretch>
+            <a:fillRect/>
+          </a:stretch>
+        </p:blipFill>
+        <p:spPr>
+          <a:xfrm>
+            <a:off x="0" y="453788"/>
+            <a:ext cx="9144000" cy="5950424"/>
+          </a:xfrm>
+          <a:prstGeom prst="rect">
+            <a:avLst/>
+          </a:prstGeom>
+        </p:spPr>
+      </p:pic>
+    </p:spTree>
+    <p:extLst>
+      <p:ext uri="{BB962C8B-B14F-4D97-AF65-F5344CB8AC3E}">
+        <p14:creationId xmlns:p14="http://schemas.microsoft.com/office/powerpoint/2010/main" val="3303365867"/>
+      </p:ext>
+    </p:extLst>
+  </p:cSld>
+  <p:clrMapOvr>
+    <a:masterClrMapping/>
+  </p:clrMapOvr>
+</p:sld>
+</file>
+
+<file path=ppt/slides/slide14.xml><?xml version="1.0" encoding="utf-8"?>
+<p:sld xmlns:a="http://schemas.openxmlformats.org/drawingml/2006/main" xmlns:r="http://schemas.openxmlformats.org/officeDocument/2006/relationships" xmlns:p="http://schemas.openxmlformats.org/presentationml/2006/main">
+  <p:cSld>
+    <p:spTree>
+      <p:nvGrpSpPr>
+        <p:cNvPr id="1" name=""/>
+        <p:cNvGrpSpPr/>
+        <p:nvPr/>
+      </p:nvGrpSpPr>
+      <p:grpSpPr>
+        <a:xfrm>
+          <a:off x="0" y="0"/>
+          <a:ext cx="0" cy="0"/>
+          <a:chOff x="0" y="0"/>
+          <a:chExt cx="0" cy="0"/>
+        </a:xfrm>
+      </p:grpSpPr>
+      <p:pic>
+        <p:nvPicPr>
+          <p:cNvPr id="3" name="Picture 2">
+            <a:extLst>
+              <a:ext uri="{FF2B5EF4-FFF2-40B4-BE49-F238E27FC236}">
+                <a16:creationId xmlns:a16="http://schemas.microsoft.com/office/drawing/2014/main" id="{E1592E69-CAD2-4533-AA1B-9D4AE5932BF8}"/>
+              </a:ext>
+            </a:extLst>
+          </p:cNvPr>
+          <p:cNvPicPr>
+            <a:picLocks noChangeAspect="1"/>
+          </p:cNvPicPr>
+          <p:nvPr/>
+        </p:nvPicPr>
+        <p:blipFill>
+          <a:blip r:embed="rId2"/>
+          <a:stretch>
+            <a:fillRect/>
+          </a:stretch>
+        </p:blipFill>
+        <p:spPr>
+          <a:xfrm>
+            <a:off x="0" y="453788"/>
+            <a:ext cx="9144000" cy="5950424"/>
+          </a:xfrm>
+          <a:prstGeom prst="rect">
+            <a:avLst/>
+          </a:prstGeom>
+        </p:spPr>
+      </p:pic>
+    </p:spTree>
+    <p:extLst>
+      <p:ext uri="{BB962C8B-B14F-4D97-AF65-F5344CB8AC3E}">
+        <p14:creationId xmlns:p14="http://schemas.microsoft.com/office/powerpoint/2010/main" val="1274770709"/>
+      </p:ext>
+    </p:extLst>
+  </p:cSld>
+  <p:clrMapOvr>
+    <a:masterClrMapping/>
+  </p:clrMapOvr>
+</p:sld>
+</file>
+
+<file path=ppt/slides/slide15.xml><?xml version="1.0" encoding="utf-8"?>
+<p:sld xmlns:a="http://schemas.openxmlformats.org/drawingml/2006/main" xmlns:r="http://schemas.openxmlformats.org/officeDocument/2006/relationships" xmlns:p="http://schemas.openxmlformats.org/presentationml/2006/main">
+  <p:cSld>
+    <p:spTree>
+      <p:nvGrpSpPr>
+        <p:cNvPr id="1" name=""/>
+        <p:cNvGrpSpPr/>
+        <p:nvPr/>
+      </p:nvGrpSpPr>
+      <p:grpSpPr>
+        <a:xfrm>
+          <a:off x="0" y="0"/>
+          <a:ext cx="0" cy="0"/>
+          <a:chOff x="0" y="0"/>
+          <a:chExt cx="0" cy="0"/>
+        </a:xfrm>
+      </p:grpSpPr>
+      <p:pic>
+        <p:nvPicPr>
+          <p:cNvPr id="5" name="Picture 4">
+            <a:extLst>
+              <a:ext uri="{FF2B5EF4-FFF2-40B4-BE49-F238E27FC236}">
+                <a16:creationId xmlns:a16="http://schemas.microsoft.com/office/drawing/2014/main" id="{381A271F-0F1D-45FD-93B1-EB56F23B953F}"/>
+              </a:ext>
+            </a:extLst>
+          </p:cNvPr>
+          <p:cNvPicPr>
+            <a:picLocks noChangeAspect="1"/>
+          </p:cNvPicPr>
+          <p:nvPr/>
+        </p:nvPicPr>
+        <p:blipFill rotWithShape="1">
+          <a:blip r:embed="rId2"/>
+          <a:srcRect l="1271" t="14361" r="35000" b="11218"/>
+          <a:stretch/>
+        </p:blipFill>
+        <p:spPr>
+          <a:xfrm>
+            <a:off x="526941" y="426203"/>
+            <a:ext cx="7487598" cy="5187552"/>
+          </a:xfrm>
+          <a:prstGeom prst="rect">
+            <a:avLst/>
+          </a:prstGeom>
+        </p:spPr>
+      </p:pic>
+      <p:sp>
+        <p:nvSpPr>
+          <p:cNvPr id="6" name="Oval 5">
+            <a:extLst>
+              <a:ext uri="{FF2B5EF4-FFF2-40B4-BE49-F238E27FC236}">
+                <a16:creationId xmlns:a16="http://schemas.microsoft.com/office/drawing/2014/main" id="{2F5C20F3-8588-4507-A0BF-9DD4FAA371E0}"/>
+              </a:ext>
+            </a:extLst>
+          </p:cNvPr>
+          <p:cNvSpPr/>
+          <p:nvPr/>
+        </p:nvSpPr>
+        <p:spPr>
+          <a:xfrm>
+            <a:off x="2467323" y="4592669"/>
+            <a:ext cx="2195083" cy="669009"/>
+          </a:xfrm>
+          <a:prstGeom prst="ellipse">
+            <a:avLst/>
+          </a:prstGeom>
+          <a:noFill/>
+          <a:ln w="38100">
+            <a:solidFill>
+              <a:srgbClr val="C00000"/>
+            </a:solidFill>
+          </a:ln>
+        </p:spPr>
+        <p:style>
+          <a:lnRef idx="2">
+            <a:schemeClr val="accent1">
+              <a:shade val="50000"/>
+            </a:schemeClr>
+          </a:lnRef>
+          <a:fillRef idx="1">
+            <a:schemeClr val="accent1"/>
+          </a:fillRef>
+          <a:effectRef idx="0">
+            <a:schemeClr val="accent1"/>
+          </a:effectRef>
+          <a:fontRef idx="minor">
+            <a:schemeClr val="lt1"/>
+          </a:fontRef>
+        </p:style>
+        <p:txBody>
+          <a:bodyPr rtlCol="0" anchor="ctr"/>
+          <a:lstStyle/>
+          <a:p>
+            <a:pPr algn="ctr"/>
+            <a:endParaRPr lang="en-SG"/>
+          </a:p>
+        </p:txBody>
+      </p:sp>
+      <p:sp>
+        <p:nvSpPr>
+          <p:cNvPr id="4" name="TextBox 3">
+            <a:extLst>
+              <a:ext uri="{FF2B5EF4-FFF2-40B4-BE49-F238E27FC236}">
+                <a16:creationId xmlns:a16="http://schemas.microsoft.com/office/drawing/2014/main" id="{456BF60A-298F-4471-A1E0-25332E51B54D}"/>
+              </a:ext>
+            </a:extLst>
+          </p:cNvPr>
+          <p:cNvSpPr txBox="1"/>
+          <p:nvPr/>
+        </p:nvSpPr>
+        <p:spPr>
+          <a:xfrm>
+            <a:off x="774296" y="5374858"/>
+            <a:ext cx="4436310" cy="369332"/>
+          </a:xfrm>
+          <a:prstGeom prst="rect">
+            <a:avLst/>
+          </a:prstGeom>
+          <a:solidFill>
+            <a:schemeClr val="bg1"/>
+          </a:solidFill>
+          <a:ln w="38100">
+            <a:solidFill>
+              <a:srgbClr val="C00000"/>
+            </a:solidFill>
+          </a:ln>
+          <a:effectLst>
+            <a:outerShdw blurRad="50800" dist="254000" dir="2700000" algn="t" rotWithShape="0">
+              <a:prstClr val="black">
+                <a:alpha val="40000"/>
+              </a:prstClr>
+            </a:outerShdw>
+          </a:effectLst>
+        </p:spPr>
+        <p:txBody>
+          <a:bodyPr wrap="square" rtlCol="0">
+            <a:spAutoFit/>
+          </a:bodyPr>
+          <a:lstStyle/>
+          <a:p>
+            <a:r>
+              <a:rPr lang="en-SG" dirty="0"/>
+              <a:t>See the guide for signature attribution</a:t>
+            </a:r>
+          </a:p>
+        </p:txBody>
+      </p:sp>
+      <p:sp>
+        <p:nvSpPr>
+          <p:cNvPr id="7" name="Freeform: Shape 6">
+            <a:extLst>
+              <a:ext uri="{FF2B5EF4-FFF2-40B4-BE49-F238E27FC236}">
+                <a16:creationId xmlns:a16="http://schemas.microsoft.com/office/drawing/2014/main" id="{8D2C07E7-95D7-49A3-A939-28B812E3D1B3}"/>
+              </a:ext>
+            </a:extLst>
+          </p:cNvPr>
+          <p:cNvSpPr/>
+          <p:nvPr/>
+        </p:nvSpPr>
+        <p:spPr>
+          <a:xfrm>
+            <a:off x="1886369" y="4997598"/>
+            <a:ext cx="631231" cy="355434"/>
+          </a:xfrm>
+          <a:custGeom>
+            <a:avLst/>
+            <a:gdLst>
+              <a:gd name="connsiteX0" fmla="*/ 0 w 631231"/>
+              <a:gd name="connsiteY0" fmla="*/ 305078 h 305078"/>
+              <a:gd name="connsiteX1" fmla="*/ 330364 w 631231"/>
+              <a:gd name="connsiteY1" fmla="*/ 33708 h 305078"/>
+              <a:gd name="connsiteX2" fmla="*/ 631231 w 631231"/>
+              <a:gd name="connsiteY2" fmla="*/ 4211 h 305078"/>
+              <a:gd name="connsiteX3" fmla="*/ 631231 w 631231"/>
+              <a:gd name="connsiteY3" fmla="*/ 4211 h 305078"/>
+              <a:gd name="connsiteX4" fmla="*/ 631231 w 631231"/>
+              <a:gd name="connsiteY4" fmla="*/ 4211 h 305078"/>
+            </a:gdLst>
+            <a:ahLst/>
+            <a:cxnLst>
+              <a:cxn ang="0">
+                <a:pos x="connsiteX0" y="connsiteY0"/>
+              </a:cxn>
+              <a:cxn ang="0">
+                <a:pos x="connsiteX1" y="connsiteY1"/>
+              </a:cxn>
+              <a:cxn ang="0">
+                <a:pos x="connsiteX2" y="connsiteY2"/>
+              </a:cxn>
+              <a:cxn ang="0">
+                <a:pos x="connsiteX3" y="connsiteY3"/>
+              </a:cxn>
+              <a:cxn ang="0">
+                <a:pos x="connsiteX4" y="connsiteY4"/>
+              </a:cxn>
+            </a:cxnLst>
+            <a:rect l="l" t="t" r="r" b="b"/>
+            <a:pathLst>
+              <a:path w="631231" h="305078">
+                <a:moveTo>
+                  <a:pt x="0" y="305078"/>
+                </a:moveTo>
+                <a:cubicBezTo>
+                  <a:pt x="112579" y="194465"/>
+                  <a:pt x="225159" y="83852"/>
+                  <a:pt x="330364" y="33708"/>
+                </a:cubicBezTo>
+                <a:cubicBezTo>
+                  <a:pt x="435569" y="-16437"/>
+                  <a:pt x="631231" y="4211"/>
+                  <a:pt x="631231" y="4211"/>
+                </a:cubicBezTo>
+                <a:lnTo>
+                  <a:pt x="631231" y="4211"/>
+                </a:lnTo>
+                <a:lnTo>
+                  <a:pt x="631231" y="4211"/>
+                </a:lnTo>
+              </a:path>
+            </a:pathLst>
+          </a:custGeom>
+          <a:noFill/>
+          <a:ln w="38100">
+            <a:solidFill>
+              <a:srgbClr val="C00000"/>
+            </a:solidFill>
+            <a:headEnd type="none" w="med" len="med"/>
+            <a:tailEnd type="arrow" w="med" len="med"/>
+          </a:ln>
+        </p:spPr>
+        <p:style>
+          <a:lnRef idx="2">
+            <a:schemeClr val="accent1">
+              <a:shade val="50000"/>
+            </a:schemeClr>
+          </a:lnRef>
+          <a:fillRef idx="1">
+            <a:schemeClr val="accent1"/>
+          </a:fillRef>
+          <a:effectRef idx="0">
+            <a:schemeClr val="accent1"/>
+          </a:effectRef>
+          <a:fontRef idx="minor">
+            <a:schemeClr val="lt1"/>
+          </a:fontRef>
+        </p:style>
+        <p:txBody>
+          <a:bodyPr rtlCol="0" anchor="ctr"/>
+          <a:lstStyle/>
+          <a:p>
+            <a:pPr algn="ctr"/>
+            <a:endParaRPr lang="en-SG"/>
+          </a:p>
+        </p:txBody>
+      </p:sp>
+    </p:spTree>
+    <p:extLst>
+      <p:ext uri="{BB962C8B-B14F-4D97-AF65-F5344CB8AC3E}">
+        <p14:creationId xmlns:p14="http://schemas.microsoft.com/office/powerpoint/2010/main" val="1244984316"/>
+      </p:ext>
+    </p:extLst>
+  </p:cSld>
+  <p:clrMapOvr>
+    <a:masterClrMapping/>
+  </p:clrMapOvr>
+</p:sld>
+</file>
+
 <file path=ppt/slides/slide2.xml><?xml version="1.0" encoding="utf-8"?>
 <p:sld xmlns:a="http://schemas.openxmlformats.org/drawingml/2006/main" xmlns:r="http://schemas.openxmlformats.org/officeDocument/2006/relationships" xmlns:p="http://schemas.openxmlformats.org/presentationml/2006/main">
   <p:cSld>
@@ -4831,6 +5407,280 @@
     <p:extLst>
       <p:ext uri="{BB962C8B-B14F-4D97-AF65-F5344CB8AC3E}">
         <p14:creationId xmlns:p14="http://schemas.microsoft.com/office/powerpoint/2010/main" val="3991326378"/>
+      </p:ext>
+    </p:extLst>
+  </p:cSld>
+  <p:clrMapOvr>
+    <a:masterClrMapping/>
+  </p:clrMapOvr>
+</p:sld>
+</file>
+
+<file path=ppt/slides/slide8.xml><?xml version="1.0" encoding="utf-8"?>
+<p:sld xmlns:a="http://schemas.openxmlformats.org/drawingml/2006/main" xmlns:r="http://schemas.openxmlformats.org/officeDocument/2006/relationships" xmlns:p="http://schemas.openxmlformats.org/presentationml/2006/main">
+  <p:cSld>
+    <p:spTree>
+      <p:nvGrpSpPr>
+        <p:cNvPr id="1" name=""/>
+        <p:cNvGrpSpPr/>
+        <p:nvPr/>
+      </p:nvGrpSpPr>
+      <p:grpSpPr>
+        <a:xfrm>
+          <a:off x="0" y="0"/>
+          <a:ext cx="0" cy="0"/>
+          <a:chOff x="0" y="0"/>
+          <a:chExt cx="0" cy="0"/>
+        </a:xfrm>
+      </p:grpSpPr>
+      <p:pic>
+        <p:nvPicPr>
+          <p:cNvPr id="6" name="Picture 5">
+            <a:extLst>
+              <a:ext uri="{FF2B5EF4-FFF2-40B4-BE49-F238E27FC236}">
+                <a16:creationId xmlns:a16="http://schemas.microsoft.com/office/drawing/2014/main" id="{B9818775-E90C-460C-9CE9-86B7013243AD}"/>
+              </a:ext>
+            </a:extLst>
+          </p:cNvPr>
+          <p:cNvPicPr>
+            <a:picLocks noChangeAspect="1"/>
+          </p:cNvPicPr>
+          <p:nvPr/>
+        </p:nvPicPr>
+        <p:blipFill rotWithShape="1">
+          <a:blip r:embed="rId2"/>
+          <a:srcRect l="1102" t="15572" r="34746" b="1612"/>
+          <a:stretch/>
+        </p:blipFill>
+        <p:spPr>
+          <a:xfrm>
+            <a:off x="526941" y="342146"/>
+            <a:ext cx="7557970" cy="5271609"/>
+          </a:xfrm>
+          <a:prstGeom prst="rect">
+            <a:avLst/>
+          </a:prstGeom>
+        </p:spPr>
+      </p:pic>
+      <p:sp>
+        <p:nvSpPr>
+          <p:cNvPr id="7" name="Oval 6">
+            <a:extLst>
+              <a:ext uri="{FF2B5EF4-FFF2-40B4-BE49-F238E27FC236}">
+                <a16:creationId xmlns:a16="http://schemas.microsoft.com/office/drawing/2014/main" id="{54B6EE57-B599-4650-9A7E-744E2D1C056F}"/>
+              </a:ext>
+            </a:extLst>
+          </p:cNvPr>
+          <p:cNvSpPr/>
+          <p:nvPr/>
+        </p:nvSpPr>
+        <p:spPr>
+          <a:xfrm>
+            <a:off x="617859" y="3975315"/>
+            <a:ext cx="2195083" cy="718106"/>
+          </a:xfrm>
+          <a:prstGeom prst="ellipse">
+            <a:avLst/>
+          </a:prstGeom>
+          <a:noFill/>
+          <a:ln w="38100">
+            <a:solidFill>
+              <a:srgbClr val="C00000"/>
+            </a:solidFill>
+          </a:ln>
+        </p:spPr>
+        <p:style>
+          <a:lnRef idx="2">
+            <a:schemeClr val="accent1">
+              <a:shade val="50000"/>
+            </a:schemeClr>
+          </a:lnRef>
+          <a:fillRef idx="1">
+            <a:schemeClr val="accent1"/>
+          </a:fillRef>
+          <a:effectRef idx="0">
+            <a:schemeClr val="accent1"/>
+          </a:effectRef>
+          <a:fontRef idx="minor">
+            <a:schemeClr val="lt1"/>
+          </a:fontRef>
+        </p:style>
+        <p:txBody>
+          <a:bodyPr rtlCol="0" anchor="ctr"/>
+          <a:lstStyle/>
+          <a:p>
+            <a:pPr algn="ctr"/>
+            <a:endParaRPr lang="en-SG"/>
+          </a:p>
+        </p:txBody>
+      </p:sp>
+      <p:sp>
+        <p:nvSpPr>
+          <p:cNvPr id="8" name="Oval 7">
+            <a:extLst>
+              <a:ext uri="{FF2B5EF4-FFF2-40B4-BE49-F238E27FC236}">
+                <a16:creationId xmlns:a16="http://schemas.microsoft.com/office/drawing/2014/main" id="{60622D74-3EDC-4014-98D8-D79A2062059E}"/>
+              </a:ext>
+            </a:extLst>
+          </p:cNvPr>
+          <p:cNvSpPr/>
+          <p:nvPr/>
+        </p:nvSpPr>
+        <p:spPr>
+          <a:xfrm>
+            <a:off x="2444076" y="3492285"/>
+            <a:ext cx="2195083" cy="718106"/>
+          </a:xfrm>
+          <a:prstGeom prst="ellipse">
+            <a:avLst/>
+          </a:prstGeom>
+          <a:noFill/>
+          <a:ln w="38100">
+            <a:solidFill>
+              <a:srgbClr val="C00000"/>
+            </a:solidFill>
+          </a:ln>
+        </p:spPr>
+        <p:style>
+          <a:lnRef idx="2">
+            <a:schemeClr val="accent1">
+              <a:shade val="50000"/>
+            </a:schemeClr>
+          </a:lnRef>
+          <a:fillRef idx="1">
+            <a:schemeClr val="accent1"/>
+          </a:fillRef>
+          <a:effectRef idx="0">
+            <a:schemeClr val="accent1"/>
+          </a:effectRef>
+          <a:fontRef idx="minor">
+            <a:schemeClr val="lt1"/>
+          </a:fontRef>
+        </p:style>
+        <p:txBody>
+          <a:bodyPr rtlCol="0" anchor="ctr"/>
+          <a:lstStyle/>
+          <a:p>
+            <a:pPr algn="ctr"/>
+            <a:endParaRPr lang="en-SG"/>
+          </a:p>
+        </p:txBody>
+      </p:sp>
+    </p:spTree>
+    <p:extLst>
+      <p:ext uri="{BB962C8B-B14F-4D97-AF65-F5344CB8AC3E}">
+        <p14:creationId xmlns:p14="http://schemas.microsoft.com/office/powerpoint/2010/main" val="72597990"/>
+      </p:ext>
+    </p:extLst>
+  </p:cSld>
+  <p:clrMapOvr>
+    <a:masterClrMapping/>
+  </p:clrMapOvr>
+</p:sld>
+</file>
+
+<file path=ppt/slides/slide9.xml><?xml version="1.0" encoding="utf-8"?>
+<p:sld xmlns:a="http://schemas.openxmlformats.org/drawingml/2006/main" xmlns:r="http://schemas.openxmlformats.org/officeDocument/2006/relationships" xmlns:p="http://schemas.openxmlformats.org/presentationml/2006/main">
+  <p:cSld>
+    <p:spTree>
+      <p:nvGrpSpPr>
+        <p:cNvPr id="1" name=""/>
+        <p:cNvGrpSpPr/>
+        <p:nvPr/>
+      </p:nvGrpSpPr>
+      <p:grpSpPr>
+        <a:xfrm>
+          <a:off x="0" y="0"/>
+          <a:ext cx="0" cy="0"/>
+          <a:chOff x="0" y="0"/>
+          <a:chExt cx="0" cy="0"/>
+        </a:xfrm>
+      </p:grpSpPr>
+      <p:pic>
+        <p:nvPicPr>
+          <p:cNvPr id="5" name="Picture 4">
+            <a:extLst>
+              <a:ext uri="{FF2B5EF4-FFF2-40B4-BE49-F238E27FC236}">
+                <a16:creationId xmlns:a16="http://schemas.microsoft.com/office/drawing/2014/main" id="{381A271F-0F1D-45FD-93B1-EB56F23B953F}"/>
+              </a:ext>
+            </a:extLst>
+          </p:cNvPr>
+          <p:cNvPicPr>
+            <a:picLocks noChangeAspect="1"/>
+          </p:cNvPicPr>
+          <p:nvPr/>
+        </p:nvPicPr>
+        <p:blipFill rotWithShape="1">
+          <a:blip r:embed="rId2"/>
+          <a:srcRect l="1271" t="14361" r="35000" b="11218"/>
+          <a:stretch/>
+        </p:blipFill>
+        <p:spPr>
+          <a:xfrm>
+            <a:off x="526941" y="426203"/>
+            <a:ext cx="7487598" cy="5187552"/>
+          </a:xfrm>
+          <a:prstGeom prst="rect">
+            <a:avLst/>
+          </a:prstGeom>
+        </p:spPr>
+      </p:pic>
+      <p:sp>
+        <p:nvSpPr>
+          <p:cNvPr id="6" name="Oval 5">
+            <a:extLst>
+              <a:ext uri="{FF2B5EF4-FFF2-40B4-BE49-F238E27FC236}">
+                <a16:creationId xmlns:a16="http://schemas.microsoft.com/office/drawing/2014/main" id="{2F5C20F3-8588-4507-A0BF-9DD4FAA371E0}"/>
+              </a:ext>
+            </a:extLst>
+          </p:cNvPr>
+          <p:cNvSpPr/>
+          <p:nvPr/>
+        </p:nvSpPr>
+        <p:spPr>
+          <a:xfrm>
+            <a:off x="2467323" y="4034727"/>
+            <a:ext cx="2195083" cy="669009"/>
+          </a:xfrm>
+          <a:prstGeom prst="ellipse">
+            <a:avLst/>
+          </a:prstGeom>
+          <a:noFill/>
+          <a:ln w="38100">
+            <a:solidFill>
+              <a:srgbClr val="C00000"/>
+            </a:solidFill>
+          </a:ln>
+        </p:spPr>
+        <p:style>
+          <a:lnRef idx="2">
+            <a:schemeClr val="accent1">
+              <a:shade val="50000"/>
+            </a:schemeClr>
+          </a:lnRef>
+          <a:fillRef idx="1">
+            <a:schemeClr val="accent1"/>
+          </a:fillRef>
+          <a:effectRef idx="0">
+            <a:schemeClr val="accent1"/>
+          </a:effectRef>
+          <a:fontRef idx="minor">
+            <a:schemeClr val="lt1"/>
+          </a:fontRef>
+        </p:style>
+        <p:txBody>
+          <a:bodyPr rtlCol="0" anchor="ctr"/>
+          <a:lstStyle/>
+          <a:p>
+            <a:pPr algn="ctr"/>
+            <a:endParaRPr lang="en-SG"/>
+          </a:p>
+        </p:txBody>
+      </p:sp>
+    </p:spTree>
+    <p:extLst>
+      <p:ext uri="{BB962C8B-B14F-4D97-AF65-F5344CB8AC3E}">
+        <p14:creationId xmlns:p14="http://schemas.microsoft.com/office/powerpoint/2010/main" val="1872305507"/>
       </p:ext>
     </p:extLst>
   </p:cSld>

</xml_diff>

<commit_message>
first version of help pages finished
</commit_message>
<xml_diff>
--- a/data-raw/VCF-to-spectra.guide-images.pptx
+++ b/data-raw/VCF-to-spectra.guide-images.pptx
@@ -15,11 +15,10 @@
     <p:sldId id="263" r:id="rId9"/>
     <p:sldId id="264" r:id="rId10"/>
     <p:sldId id="266" r:id="rId11"/>
-    <p:sldId id="267" r:id="rId12"/>
-    <p:sldId id="268" r:id="rId13"/>
-    <p:sldId id="269" r:id="rId14"/>
-    <p:sldId id="270" r:id="rId15"/>
-    <p:sldId id="265" r:id="rId16"/>
+    <p:sldId id="272" r:id="rId12"/>
+    <p:sldId id="269" r:id="rId13"/>
+    <p:sldId id="274" r:id="rId14"/>
+    <p:sldId id="265" r:id="rId15"/>
   </p:sldIdLst>
   <p:sldSz cx="9144000" cy="6858000" type="letter"/>
   <p:notesSz cx="6858000" cy="9144000"/>
@@ -257,7 +256,7 @@
           <a:p>
             <a:fld id="{66AE7D31-4543-4246-8104-C1412A41A8A2}" type="datetimeFigureOut">
               <a:rPr lang="en-SG" smtClean="0"/>
-              <a:t>21/12/2020</a:t>
+              <a:t>22/12/2020</a:t>
             </a:fld>
             <a:endParaRPr lang="en-SG"/>
           </a:p>
@@ -427,7 +426,7 @@
           <a:p>
             <a:fld id="{66AE7D31-4543-4246-8104-C1412A41A8A2}" type="datetimeFigureOut">
               <a:rPr lang="en-SG" smtClean="0"/>
-              <a:t>21/12/2020</a:t>
+              <a:t>22/12/2020</a:t>
             </a:fld>
             <a:endParaRPr lang="en-SG"/>
           </a:p>
@@ -607,7 +606,7 @@
           <a:p>
             <a:fld id="{66AE7D31-4543-4246-8104-C1412A41A8A2}" type="datetimeFigureOut">
               <a:rPr lang="en-SG" smtClean="0"/>
-              <a:t>21/12/2020</a:t>
+              <a:t>22/12/2020</a:t>
             </a:fld>
             <a:endParaRPr lang="en-SG"/>
           </a:p>
@@ -777,7 +776,7 @@
           <a:p>
             <a:fld id="{66AE7D31-4543-4246-8104-C1412A41A8A2}" type="datetimeFigureOut">
               <a:rPr lang="en-SG" smtClean="0"/>
-              <a:t>21/12/2020</a:t>
+              <a:t>22/12/2020</a:t>
             </a:fld>
             <a:endParaRPr lang="en-SG"/>
           </a:p>
@@ -1021,7 +1020,7 @@
           <a:p>
             <a:fld id="{66AE7D31-4543-4246-8104-C1412A41A8A2}" type="datetimeFigureOut">
               <a:rPr lang="en-SG" smtClean="0"/>
-              <a:t>21/12/2020</a:t>
+              <a:t>22/12/2020</a:t>
             </a:fld>
             <a:endParaRPr lang="en-SG"/>
           </a:p>
@@ -1253,7 +1252,7 @@
           <a:p>
             <a:fld id="{66AE7D31-4543-4246-8104-C1412A41A8A2}" type="datetimeFigureOut">
               <a:rPr lang="en-SG" smtClean="0"/>
-              <a:t>21/12/2020</a:t>
+              <a:t>22/12/2020</a:t>
             </a:fld>
             <a:endParaRPr lang="en-SG"/>
           </a:p>
@@ -1620,7 +1619,7 @@
           <a:p>
             <a:fld id="{66AE7D31-4543-4246-8104-C1412A41A8A2}" type="datetimeFigureOut">
               <a:rPr lang="en-SG" smtClean="0"/>
-              <a:t>21/12/2020</a:t>
+              <a:t>22/12/2020</a:t>
             </a:fld>
             <a:endParaRPr lang="en-SG"/>
           </a:p>
@@ -1738,7 +1737,7 @@
           <a:p>
             <a:fld id="{66AE7D31-4543-4246-8104-C1412A41A8A2}" type="datetimeFigureOut">
               <a:rPr lang="en-SG" smtClean="0"/>
-              <a:t>21/12/2020</a:t>
+              <a:t>22/12/2020</a:t>
             </a:fld>
             <a:endParaRPr lang="en-SG"/>
           </a:p>
@@ -1833,7 +1832,7 @@
           <a:p>
             <a:fld id="{66AE7D31-4543-4246-8104-C1412A41A8A2}" type="datetimeFigureOut">
               <a:rPr lang="en-SG" smtClean="0"/>
-              <a:t>21/12/2020</a:t>
+              <a:t>22/12/2020</a:t>
             </a:fld>
             <a:endParaRPr lang="en-SG"/>
           </a:p>
@@ -2110,7 +2109,7 @@
           <a:p>
             <a:fld id="{66AE7D31-4543-4246-8104-C1412A41A8A2}" type="datetimeFigureOut">
               <a:rPr lang="en-SG" smtClean="0"/>
-              <a:t>21/12/2020</a:t>
+              <a:t>22/12/2020</a:t>
             </a:fld>
             <a:endParaRPr lang="en-SG"/>
           </a:p>
@@ -2367,7 +2366,7 @@
           <a:p>
             <a:fld id="{66AE7D31-4543-4246-8104-C1412A41A8A2}" type="datetimeFigureOut">
               <a:rPr lang="en-SG" smtClean="0"/>
-              <a:t>21/12/2020</a:t>
+              <a:t>22/12/2020</a:t>
             </a:fld>
             <a:endParaRPr lang="en-SG"/>
           </a:p>
@@ -2580,7 +2579,7 @@
           <a:p>
             <a:fld id="{66AE7D31-4543-4246-8104-C1412A41A8A2}" type="datetimeFigureOut">
               <a:rPr lang="en-SG" smtClean="0"/>
-              <a:t>21/12/2020</a:t>
+              <a:t>22/12/2020</a:t>
             </a:fld>
             <a:endParaRPr lang="en-SG"/>
           </a:p>
@@ -3046,10 +3045,10 @@
       </p:grpSpPr>
       <p:pic>
         <p:nvPicPr>
-          <p:cNvPr id="3" name="Picture 2">
+          <p:cNvPr id="4" name="Picture 3">
             <a:extLst>
               <a:ext uri="{FF2B5EF4-FFF2-40B4-BE49-F238E27FC236}">
-                <a16:creationId xmlns:a16="http://schemas.microsoft.com/office/drawing/2014/main" id="{0E76048E-3838-486F-A7C5-753B5ECBD433}"/>
+                <a16:creationId xmlns:a16="http://schemas.microsoft.com/office/drawing/2014/main" id="{8767940B-390A-4E0A-BAC7-7C884E9C0800}"/>
               </a:ext>
             </a:extLst>
           </p:cNvPr>
@@ -3058,16 +3057,44 @@
           </p:cNvPicPr>
           <p:nvPr/>
         </p:nvPicPr>
-        <p:blipFill>
+        <p:blipFill rotWithShape="1">
           <a:blip r:embed="rId2"/>
-          <a:stretch>
-            <a:fillRect/>
-          </a:stretch>
+          <a:srcRect l="646" t="15488" r="1999" b="14655"/>
+          <a:stretch/>
         </p:blipFill>
         <p:spPr>
           <a:xfrm>
-            <a:off x="0" y="716507"/>
-            <a:ext cx="9144000" cy="5424985"/>
+            <a:off x="70792" y="224174"/>
+            <a:ext cx="8902126" cy="2725503"/>
+          </a:xfrm>
+          <a:prstGeom prst="rect">
+            <a:avLst/>
+          </a:prstGeom>
+        </p:spPr>
+      </p:pic>
+      <p:pic>
+        <p:nvPicPr>
+          <p:cNvPr id="5" name="Picture 4">
+            <a:extLst>
+              <a:ext uri="{FF2B5EF4-FFF2-40B4-BE49-F238E27FC236}">
+                <a16:creationId xmlns:a16="http://schemas.microsoft.com/office/drawing/2014/main" id="{B8CBB697-6F1B-46A5-B975-C57CCEFBDEE4}"/>
+              </a:ext>
+            </a:extLst>
+          </p:cNvPr>
+          <p:cNvPicPr>
+            <a:picLocks noChangeAspect="1"/>
+          </p:cNvPicPr>
+          <p:nvPr/>
+        </p:nvPicPr>
+        <p:blipFill rotWithShape="1">
+          <a:blip r:embed="rId3"/>
+          <a:srcRect l="774" t="15789" r="2064" b="19947"/>
+          <a:stretch/>
+        </p:blipFill>
+        <p:spPr>
+          <a:xfrm>
+            <a:off x="79640" y="2819891"/>
+            <a:ext cx="8884429" cy="2507226"/>
           </a:xfrm>
           <a:prstGeom prst="rect">
             <a:avLst/>
@@ -3109,7 +3136,7 @@
           <p:cNvPr id="3" name="Picture 2">
             <a:extLst>
               <a:ext uri="{FF2B5EF4-FFF2-40B4-BE49-F238E27FC236}">
-                <a16:creationId xmlns:a16="http://schemas.microsoft.com/office/drawing/2014/main" id="{092E7AB5-7091-4A37-834C-AAE6D2566114}"/>
+                <a16:creationId xmlns:a16="http://schemas.microsoft.com/office/drawing/2014/main" id="{03AAE52E-C1FE-45AF-BD85-C76DB4EC5612}"/>
               </a:ext>
             </a:extLst>
           </p:cNvPr>
@@ -3118,16 +3145,44 @@
           </p:cNvPicPr>
           <p:nvPr/>
         </p:nvPicPr>
-        <p:blipFill>
+        <p:blipFill rotWithShape="1">
           <a:blip r:embed="rId2"/>
-          <a:stretch>
-            <a:fillRect/>
-          </a:stretch>
+          <a:srcRect l="1096" t="12941" r="1356" b="7809"/>
+          <a:stretch/>
         </p:blipFill>
         <p:spPr>
           <a:xfrm>
-            <a:off x="0" y="716507"/>
-            <a:ext cx="9144000" cy="5424985"/>
+            <a:off x="224176" y="247773"/>
+            <a:ext cx="8919824" cy="3598606"/>
+          </a:xfrm>
+          <a:prstGeom prst="rect">
+            <a:avLst/>
+          </a:prstGeom>
+        </p:spPr>
+      </p:pic>
+      <p:pic>
+        <p:nvPicPr>
+          <p:cNvPr id="4" name="Picture 3">
+            <a:extLst>
+              <a:ext uri="{FF2B5EF4-FFF2-40B4-BE49-F238E27FC236}">
+                <a16:creationId xmlns:a16="http://schemas.microsoft.com/office/drawing/2014/main" id="{ACF90EA7-E974-4E94-BF8B-ADF139F2C6A4}"/>
+              </a:ext>
+            </a:extLst>
+          </p:cNvPr>
+          <p:cNvPicPr>
+            <a:picLocks noChangeAspect="1"/>
+          </p:cNvPicPr>
+          <p:nvPr/>
+        </p:nvPicPr>
+        <p:blipFill rotWithShape="1">
+          <a:blip r:embed="rId3"/>
+          <a:srcRect l="645" t="13200" r="1806" b="30545"/>
+          <a:stretch/>
+        </p:blipFill>
+        <p:spPr>
+          <a:xfrm>
+            <a:off x="112088" y="4008612"/>
+            <a:ext cx="8919824" cy="2554420"/>
           </a:xfrm>
           <a:prstGeom prst="rect">
             <a:avLst/>
@@ -3137,7 +3192,7 @@
     </p:spTree>
     <p:extLst>
       <p:ext uri="{BB962C8B-B14F-4D97-AF65-F5344CB8AC3E}">
-        <p14:creationId xmlns:p14="http://schemas.microsoft.com/office/powerpoint/2010/main" val="1211825085"/>
+        <p14:creationId xmlns:p14="http://schemas.microsoft.com/office/powerpoint/2010/main" val="2470545047"/>
       </p:ext>
     </p:extLst>
   </p:cSld>
@@ -3166,10 +3221,10 @@
       </p:grpSpPr>
       <p:pic>
         <p:nvPicPr>
-          <p:cNvPr id="3" name="Picture 2">
+          <p:cNvPr id="4" name="Picture 3">
             <a:extLst>
               <a:ext uri="{FF2B5EF4-FFF2-40B4-BE49-F238E27FC236}">
-                <a16:creationId xmlns:a16="http://schemas.microsoft.com/office/drawing/2014/main" id="{5FBA5966-532C-47E6-9EA6-0EF11D432E20}"/>
+                <a16:creationId xmlns:a16="http://schemas.microsoft.com/office/drawing/2014/main" id="{79D1F8CA-510D-405A-85A3-E662BF2950C2}"/>
               </a:ext>
             </a:extLst>
           </p:cNvPr>
@@ -3178,16 +3233,15 @@
           </p:cNvPicPr>
           <p:nvPr/>
         </p:nvPicPr>
-        <p:blipFill>
+        <p:blipFill rotWithShape="1">
           <a:blip r:embed="rId2"/>
-          <a:stretch>
-            <a:fillRect/>
-          </a:stretch>
+          <a:srcRect l="516" t="11161" r="6516" b="2099"/>
+          <a:stretch/>
         </p:blipFill>
         <p:spPr>
           <a:xfrm>
-            <a:off x="0" y="716507"/>
-            <a:ext cx="9144000" cy="5424985"/>
+            <a:off x="47195" y="1368650"/>
+            <a:ext cx="8500970" cy="4601497"/>
           </a:xfrm>
           <a:prstGeom prst="rect">
             <a:avLst/>
@@ -3197,7 +3251,7 @@
     </p:spTree>
     <p:extLst>
       <p:ext uri="{BB962C8B-B14F-4D97-AF65-F5344CB8AC3E}">
-        <p14:creationId xmlns:p14="http://schemas.microsoft.com/office/powerpoint/2010/main" val="4221034325"/>
+        <p14:creationId xmlns:p14="http://schemas.microsoft.com/office/powerpoint/2010/main" val="3303365867"/>
       </p:ext>
     </p:extLst>
   </p:cSld>
@@ -3226,10 +3280,10 @@
       </p:grpSpPr>
       <p:pic>
         <p:nvPicPr>
-          <p:cNvPr id="3" name="Picture 2">
+          <p:cNvPr id="5" name="Picture 4">
             <a:extLst>
               <a:ext uri="{FF2B5EF4-FFF2-40B4-BE49-F238E27FC236}">
-                <a16:creationId xmlns:a16="http://schemas.microsoft.com/office/drawing/2014/main" id="{EE43AEDC-AC52-4B2B-9D37-B44973C9BAC9}"/>
+                <a16:creationId xmlns:a16="http://schemas.microsoft.com/office/drawing/2014/main" id="{9395A0E9-4167-4489-96D7-48F1550ACFB6}"/>
               </a:ext>
             </a:extLst>
           </p:cNvPr>
@@ -3238,16 +3292,44 @@
           </p:cNvPicPr>
           <p:nvPr/>
         </p:nvPicPr>
-        <p:blipFill>
+        <p:blipFill rotWithShape="1">
           <a:blip r:embed="rId2"/>
-          <a:stretch>
-            <a:fillRect/>
-          </a:stretch>
+          <a:srcRect l="838" t="11273" r="18516" b="28120"/>
+          <a:stretch/>
         </p:blipFill>
         <p:spPr>
           <a:xfrm>
-            <a:off x="0" y="453788"/>
-            <a:ext cx="9144000" cy="5950424"/>
+            <a:off x="129786" y="213852"/>
+            <a:ext cx="7374193" cy="3215148"/>
+          </a:xfrm>
+          <a:prstGeom prst="rect">
+            <a:avLst/>
+          </a:prstGeom>
+        </p:spPr>
+      </p:pic>
+      <p:pic>
+        <p:nvPicPr>
+          <p:cNvPr id="6" name="Picture 5">
+            <a:extLst>
+              <a:ext uri="{FF2B5EF4-FFF2-40B4-BE49-F238E27FC236}">
+                <a16:creationId xmlns:a16="http://schemas.microsoft.com/office/drawing/2014/main" id="{DD78689A-5BE9-4D16-8433-EB71FF4C9631}"/>
+              </a:ext>
+            </a:extLst>
+          </p:cNvPr>
+          <p:cNvPicPr>
+            <a:picLocks noChangeAspect="1"/>
+          </p:cNvPicPr>
+          <p:nvPr/>
+        </p:nvPicPr>
+        <p:blipFill rotWithShape="1">
+          <a:blip r:embed="rId3"/>
+          <a:srcRect l="774" t="17606" r="1420" b="15668"/>
+          <a:stretch/>
+        </p:blipFill>
+        <p:spPr>
+          <a:xfrm>
+            <a:off x="129786" y="3545512"/>
+            <a:ext cx="8943422" cy="2336145"/>
           </a:xfrm>
           <a:prstGeom prst="rect">
             <a:avLst/>
@@ -3257,7 +3339,7 @@
     </p:spTree>
     <p:extLst>
       <p:ext uri="{BB962C8B-B14F-4D97-AF65-F5344CB8AC3E}">
-        <p14:creationId xmlns:p14="http://schemas.microsoft.com/office/powerpoint/2010/main" val="3303365867"/>
+        <p14:creationId xmlns:p14="http://schemas.microsoft.com/office/powerpoint/2010/main" val="3284380367"/>
       </p:ext>
     </p:extLst>
   </p:cSld>
@@ -3268,66 +3350,6 @@
 </file>
 
 <file path=ppt/slides/slide14.xml><?xml version="1.0" encoding="utf-8"?>
-<p:sld xmlns:a="http://schemas.openxmlformats.org/drawingml/2006/main" xmlns:r="http://schemas.openxmlformats.org/officeDocument/2006/relationships" xmlns:p="http://schemas.openxmlformats.org/presentationml/2006/main">
-  <p:cSld>
-    <p:spTree>
-      <p:nvGrpSpPr>
-        <p:cNvPr id="1" name=""/>
-        <p:cNvGrpSpPr/>
-        <p:nvPr/>
-      </p:nvGrpSpPr>
-      <p:grpSpPr>
-        <a:xfrm>
-          <a:off x="0" y="0"/>
-          <a:ext cx="0" cy="0"/>
-          <a:chOff x="0" y="0"/>
-          <a:chExt cx="0" cy="0"/>
-        </a:xfrm>
-      </p:grpSpPr>
-      <p:pic>
-        <p:nvPicPr>
-          <p:cNvPr id="3" name="Picture 2">
-            <a:extLst>
-              <a:ext uri="{FF2B5EF4-FFF2-40B4-BE49-F238E27FC236}">
-                <a16:creationId xmlns:a16="http://schemas.microsoft.com/office/drawing/2014/main" id="{E1592E69-CAD2-4533-AA1B-9D4AE5932BF8}"/>
-              </a:ext>
-            </a:extLst>
-          </p:cNvPr>
-          <p:cNvPicPr>
-            <a:picLocks noChangeAspect="1"/>
-          </p:cNvPicPr>
-          <p:nvPr/>
-        </p:nvPicPr>
-        <p:blipFill>
-          <a:blip r:embed="rId2"/>
-          <a:stretch>
-            <a:fillRect/>
-          </a:stretch>
-        </p:blipFill>
-        <p:spPr>
-          <a:xfrm>
-            <a:off x="0" y="453788"/>
-            <a:ext cx="9144000" cy="5950424"/>
-          </a:xfrm>
-          <a:prstGeom prst="rect">
-            <a:avLst/>
-          </a:prstGeom>
-        </p:spPr>
-      </p:pic>
-    </p:spTree>
-    <p:extLst>
-      <p:ext uri="{BB962C8B-B14F-4D97-AF65-F5344CB8AC3E}">
-        <p14:creationId xmlns:p14="http://schemas.microsoft.com/office/powerpoint/2010/main" val="1274770709"/>
-      </p:ext>
-    </p:extLst>
-  </p:cSld>
-  <p:clrMapOvr>
-    <a:masterClrMapping/>
-  </p:clrMapOvr>
-</p:sld>
-</file>
-
-<file path=ppt/slides/slide15.xml><?xml version="1.0" encoding="utf-8"?>
 <p:sld xmlns:a="http://schemas.openxmlformats.org/drawingml/2006/main" xmlns:r="http://schemas.openxmlformats.org/officeDocument/2006/relationships" xmlns:p="http://schemas.openxmlformats.org/presentationml/2006/main">
   <p:cSld>
     <p:spTree>

</xml_diff>